<commit_message>
Added the poster and breif
</commit_message>
<xml_diff>
--- a/Presentations/MAREA_Testing_LAFFMeeting.pptx
+++ b/Presentations/MAREA_Testing_LAFFMeeting.pptx
@@ -109,6 +109,11 @@
       </a:defRPr>
     </a:lvl9pPr>
   </p:defaultTextStyle>
+  <p:extLst>
+    <p:ext uri="{EFAFB233-063F-42B5-8137-9DF3F51BA10A}">
+      <p15:sldGuideLst xmlns:p15="http://schemas.microsoft.com/office/powerpoint/2012/main"/>
+    </p:ext>
+  </p:extLst>
 </p:presentation>
 </file>
 
@@ -3585,7 +3590,7 @@
     <p:controls>
       <mc:AlternateContent xmlns:mc="http://schemas.openxmlformats.org/markup-compatibility/2006">
         <mc:Choice xmlns:v="urn:schemas-microsoft-com:vml" Requires="v">
-          <p:control spid="12296" name="WebBrowser1" r:id="rId2" imgW="10401480" imgH="5753160"/>
+          <p:control spid="12299" name="WebBrowser1" r:id="rId2" imgW="10401480" imgH="5753160"/>
         </mc:Choice>
         <mc:Fallback>
           <p:control name="WebBrowser1" r:id="rId2" imgW="10401480" imgH="5753160">
@@ -3734,7 +3739,119 @@
               </a:rPr>
               <a:t>Any ideas on how to make the app better</a:t>
             </a:r>
+            <a:endParaRPr lang="en-US" dirty="0">
+              <a:solidFill>
+                <a:schemeClr val="bg1"/>
+              </a:solidFill>
+            </a:endParaRPr>
+          </a:p>
+          <a:p>
+            <a:endParaRPr lang="en-US" dirty="0">
+              <a:solidFill>
+                <a:schemeClr val="bg1"/>
+              </a:solidFill>
+            </a:endParaRPr>
+          </a:p>
+          <a:p>
+            <a:endParaRPr lang="en-US" dirty="0">
+              <a:solidFill>
+                <a:schemeClr val="bg1"/>
+              </a:solidFill>
+            </a:endParaRPr>
+          </a:p>
+          <a:p>
+            <a:endParaRPr lang="en-US" dirty="0">
+              <a:solidFill>
+                <a:schemeClr val="bg1"/>
+              </a:solidFill>
+            </a:endParaRPr>
+          </a:p>
+          <a:p>
+            <a:r>
+              <a:rPr lang="en-US" dirty="0">
+                <a:solidFill>
+                  <a:schemeClr val="bg1"/>
+                </a:solidFill>
+              </a:rPr>
+              <a:t>MAREA channel on Slack</a:t>
+            </a:r>
+          </a:p>
+          <a:p>
+            <a:r>
+              <a:rPr lang="en-US" dirty="0">
+                <a:solidFill>
+                  <a:schemeClr val="bg1"/>
+                </a:solidFill>
+              </a:rPr>
+              <a:t>https://github.com/turfeffect/AppDraft</a:t>
+            </a:r>
+          </a:p>
+          <a:p>
             <a:endParaRPr lang="es-MX" dirty="0">
+              <a:solidFill>
+                <a:schemeClr val="bg1"/>
+              </a:solidFill>
+            </a:endParaRPr>
+          </a:p>
+          <a:p>
+            <a:endParaRPr lang="en-US" dirty="0">
+              <a:solidFill>
+                <a:schemeClr val="bg1"/>
+              </a:solidFill>
+            </a:endParaRPr>
+          </a:p>
+        </p:txBody>
+      </p:sp>
+      <p:sp>
+        <p:nvSpPr>
+          <p:cNvPr id="4" name="Title 1"/>
+          <p:cNvSpPr txBox="1">
+            <a:spLocks/>
+          </p:cNvSpPr>
+          <p:nvPr/>
+        </p:nvSpPr>
+        <p:spPr>
+          <a:xfrm>
+            <a:off x="838200" y="3783867"/>
+            <a:ext cx="10515600" cy="1325563"/>
+          </a:xfrm>
+          <a:prstGeom prst="rect">
+            <a:avLst/>
+          </a:prstGeom>
+        </p:spPr>
+        <p:txBody>
+          <a:bodyPr vert="horz" lIns="91440" tIns="45720" rIns="91440" bIns="45720" rtlCol="0" anchor="ctr">
+            <a:normAutofit/>
+          </a:bodyPr>
+          <a:lstStyle>
+            <a:lvl1pPr algn="l" defTabSz="914400" rtl="0" eaLnBrk="1" latinLnBrk="0" hangingPunct="1">
+              <a:lnSpc>
+                <a:spcPct val="90000"/>
+              </a:lnSpc>
+              <a:spcBef>
+                <a:spcPct val="0"/>
+              </a:spcBef>
+              <a:buNone/>
+              <a:defRPr sz="4400" kern="1200">
+                <a:solidFill>
+                  <a:schemeClr val="tx1"/>
+                </a:solidFill>
+                <a:latin typeface="+mj-lt"/>
+                <a:ea typeface="+mj-ea"/>
+                <a:cs typeface="+mj-cs"/>
+              </a:defRPr>
+            </a:lvl1pPr>
+          </a:lstStyle>
+          <a:p>
+            <a:r>
+              <a:rPr lang="en-US" b="1" dirty="0">
+                <a:solidFill>
+                  <a:schemeClr val="bg1"/>
+                </a:solidFill>
+              </a:rPr>
+              <a:t>How?</a:t>
+            </a:r>
+            <a:endParaRPr lang="es-MX" b="1" dirty="0">
               <a:solidFill>
                 <a:schemeClr val="bg1"/>
               </a:solidFill>

</xml_diff>